<commit_message>
Atualização PPT OO e Lista 3
- PPT OO
- Lista Exercício 3 - OO
</commit_message>
<xml_diff>
--- a/Fundamentos/Fundamentos - Orientacao Objetos.pptx
+++ b/Fundamentos/Fundamentos - Orientacao Objetos.pptx
@@ -5,7 +5,7 @@
     <p:sldMasterId id="2147483792" r:id="rId1"/>
   </p:sldMasterIdLst>
   <p:notesMasterIdLst>
-    <p:notesMasterId r:id="rId10"/>
+    <p:notesMasterId r:id="rId14"/>
   </p:notesMasterIdLst>
   <p:sldIdLst>
     <p:sldId id="256" r:id="rId2"/>
@@ -16,6 +16,10 @@
     <p:sldId id="309" r:id="rId7"/>
     <p:sldId id="310" r:id="rId8"/>
     <p:sldId id="311" r:id="rId9"/>
+    <p:sldId id="312" r:id="rId10"/>
+    <p:sldId id="313" r:id="rId11"/>
+    <p:sldId id="314" r:id="rId12"/>
+    <p:sldId id="315" r:id="rId13"/>
   </p:sldIdLst>
   <p:sldSz cx="9144000" cy="6858000" type="screen4x3"/>
   <p:notesSz cx="6858000" cy="9144000"/>
@@ -200,7 +204,7 @@
             <a:fld id="{0798B77A-D2B4-472A-BFF6-BFE225C3220A}" type="datetimeFigureOut">
               <a:rPr lang="pt-BR" smtClean="0"/>
               <a:pPr/>
-              <a:t>24/03/2014</a:t>
+              <a:t>26/03/2014</a:t>
             </a:fld>
             <a:endParaRPr lang="pt-BR"/>
           </a:p>
@@ -548,6 +552,170 @@
 </p:notes>
 </file>
 
+<file path=ppt/notesSlides/notesSlide10.xml><?xml version="1.0" encoding="utf-8"?>
+<p:notes xmlns:a="http://schemas.openxmlformats.org/drawingml/2006/main" xmlns:r="http://schemas.openxmlformats.org/officeDocument/2006/relationships" xmlns:p="http://schemas.openxmlformats.org/presentationml/2006/main">
+  <p:cSld>
+    <p:spTree>
+      <p:nvGrpSpPr>
+        <p:cNvPr id="1" name=""/>
+        <p:cNvGrpSpPr/>
+        <p:nvPr/>
+      </p:nvGrpSpPr>
+      <p:grpSpPr>
+        <a:xfrm>
+          <a:off x="0" y="0"/>
+          <a:ext cx="0" cy="0"/>
+          <a:chOff x="0" y="0"/>
+          <a:chExt cx="0" cy="0"/>
+        </a:xfrm>
+      </p:grpSpPr>
+      <p:sp>
+        <p:nvSpPr>
+          <p:cNvPr id="2" name="Espaço Reservado para Imagem de Slide 1"/>
+          <p:cNvSpPr>
+            <a:spLocks noGrp="1" noRot="1" noChangeAspect="1"/>
+          </p:cNvSpPr>
+          <p:nvPr>
+            <p:ph type="sldImg"/>
+          </p:nvPr>
+        </p:nvSpPr>
+        <p:spPr/>
+      </p:sp>
+      <p:sp>
+        <p:nvSpPr>
+          <p:cNvPr id="3" name="Espaço Reservado para Anotações 2"/>
+          <p:cNvSpPr>
+            <a:spLocks noGrp="1"/>
+          </p:cNvSpPr>
+          <p:nvPr>
+            <p:ph type="body" idx="1"/>
+          </p:nvPr>
+        </p:nvSpPr>
+        <p:spPr/>
+        <p:txBody>
+          <a:bodyPr>
+            <a:normAutofit/>
+          </a:bodyPr>
+          <a:lstStyle/>
+          <a:p>
+            <a:endParaRPr lang="pt-BR" dirty="0" smtClean="0"/>
+          </a:p>
+        </p:txBody>
+      </p:sp>
+      <p:sp>
+        <p:nvSpPr>
+          <p:cNvPr id="4" name="Espaço Reservado para Número de Slide 3"/>
+          <p:cNvSpPr>
+            <a:spLocks noGrp="1"/>
+          </p:cNvSpPr>
+          <p:nvPr>
+            <p:ph type="sldNum" sz="quarter" idx="10"/>
+          </p:nvPr>
+        </p:nvSpPr>
+        <p:spPr/>
+        <p:txBody>
+          <a:bodyPr/>
+          <a:lstStyle/>
+          <a:p>
+            <a:fld id="{72B91EDC-0C87-4192-8AD8-36C87AC108D0}" type="slidenum">
+              <a:rPr lang="pt-BR" smtClean="0"/>
+              <a:pPr/>
+              <a:t>11</a:t>
+            </a:fld>
+            <a:endParaRPr lang="pt-BR"/>
+          </a:p>
+        </p:txBody>
+      </p:sp>
+    </p:spTree>
+  </p:cSld>
+  <p:clrMapOvr>
+    <a:masterClrMapping/>
+  </p:clrMapOvr>
+</p:notes>
+</file>
+
+<file path=ppt/notesSlides/notesSlide11.xml><?xml version="1.0" encoding="utf-8"?>
+<p:notes xmlns:a="http://schemas.openxmlformats.org/drawingml/2006/main" xmlns:r="http://schemas.openxmlformats.org/officeDocument/2006/relationships" xmlns:p="http://schemas.openxmlformats.org/presentationml/2006/main">
+  <p:cSld>
+    <p:spTree>
+      <p:nvGrpSpPr>
+        <p:cNvPr id="1" name=""/>
+        <p:cNvGrpSpPr/>
+        <p:nvPr/>
+      </p:nvGrpSpPr>
+      <p:grpSpPr>
+        <a:xfrm>
+          <a:off x="0" y="0"/>
+          <a:ext cx="0" cy="0"/>
+          <a:chOff x="0" y="0"/>
+          <a:chExt cx="0" cy="0"/>
+        </a:xfrm>
+      </p:grpSpPr>
+      <p:sp>
+        <p:nvSpPr>
+          <p:cNvPr id="2" name="Espaço Reservado para Imagem de Slide 1"/>
+          <p:cNvSpPr>
+            <a:spLocks noGrp="1" noRot="1" noChangeAspect="1"/>
+          </p:cNvSpPr>
+          <p:nvPr>
+            <p:ph type="sldImg"/>
+          </p:nvPr>
+        </p:nvSpPr>
+        <p:spPr/>
+      </p:sp>
+      <p:sp>
+        <p:nvSpPr>
+          <p:cNvPr id="3" name="Espaço Reservado para Anotações 2"/>
+          <p:cNvSpPr>
+            <a:spLocks noGrp="1"/>
+          </p:cNvSpPr>
+          <p:nvPr>
+            <p:ph type="body" idx="1"/>
+          </p:nvPr>
+        </p:nvSpPr>
+        <p:spPr/>
+        <p:txBody>
+          <a:bodyPr>
+            <a:normAutofit/>
+          </a:bodyPr>
+          <a:lstStyle/>
+          <a:p>
+            <a:endParaRPr lang="pt-BR" dirty="0" smtClean="0"/>
+          </a:p>
+        </p:txBody>
+      </p:sp>
+      <p:sp>
+        <p:nvSpPr>
+          <p:cNvPr id="4" name="Espaço Reservado para Número de Slide 3"/>
+          <p:cNvSpPr>
+            <a:spLocks noGrp="1"/>
+          </p:cNvSpPr>
+          <p:nvPr>
+            <p:ph type="sldNum" sz="quarter" idx="10"/>
+          </p:nvPr>
+        </p:nvSpPr>
+        <p:spPr/>
+        <p:txBody>
+          <a:bodyPr/>
+          <a:lstStyle/>
+          <a:p>
+            <a:fld id="{72B91EDC-0C87-4192-8AD8-36C87AC108D0}" type="slidenum">
+              <a:rPr lang="pt-BR" smtClean="0"/>
+              <a:pPr/>
+              <a:t>12</a:t>
+            </a:fld>
+            <a:endParaRPr lang="pt-BR"/>
+          </a:p>
+        </p:txBody>
+      </p:sp>
+    </p:spTree>
+  </p:cSld>
+  <p:clrMapOvr>
+    <a:masterClrMapping/>
+  </p:clrMapOvr>
+</p:notes>
+</file>
+
 <file path=ppt/notesSlides/notesSlide2.xml><?xml version="1.0" encoding="utf-8"?>
 <p:notes xmlns:a="http://schemas.openxmlformats.org/drawingml/2006/main" xmlns:r="http://schemas.openxmlformats.org/officeDocument/2006/relationships" xmlns:p="http://schemas.openxmlformats.org/presentationml/2006/main">
   <p:cSld>
@@ -1027,6 +1195,170 @@
               <a:rPr lang="pt-BR" smtClean="0"/>
               <a:pPr/>
               <a:t>8</a:t>
+            </a:fld>
+            <a:endParaRPr lang="pt-BR"/>
+          </a:p>
+        </p:txBody>
+      </p:sp>
+    </p:spTree>
+  </p:cSld>
+  <p:clrMapOvr>
+    <a:masterClrMapping/>
+  </p:clrMapOvr>
+</p:notes>
+</file>
+
+<file path=ppt/notesSlides/notesSlide8.xml><?xml version="1.0" encoding="utf-8"?>
+<p:notes xmlns:a="http://schemas.openxmlformats.org/drawingml/2006/main" xmlns:r="http://schemas.openxmlformats.org/officeDocument/2006/relationships" xmlns:p="http://schemas.openxmlformats.org/presentationml/2006/main">
+  <p:cSld>
+    <p:spTree>
+      <p:nvGrpSpPr>
+        <p:cNvPr id="1" name=""/>
+        <p:cNvGrpSpPr/>
+        <p:nvPr/>
+      </p:nvGrpSpPr>
+      <p:grpSpPr>
+        <a:xfrm>
+          <a:off x="0" y="0"/>
+          <a:ext cx="0" cy="0"/>
+          <a:chOff x="0" y="0"/>
+          <a:chExt cx="0" cy="0"/>
+        </a:xfrm>
+      </p:grpSpPr>
+      <p:sp>
+        <p:nvSpPr>
+          <p:cNvPr id="2" name="Espaço Reservado para Imagem de Slide 1"/>
+          <p:cNvSpPr>
+            <a:spLocks noGrp="1" noRot="1" noChangeAspect="1"/>
+          </p:cNvSpPr>
+          <p:nvPr>
+            <p:ph type="sldImg"/>
+          </p:nvPr>
+        </p:nvSpPr>
+        <p:spPr/>
+      </p:sp>
+      <p:sp>
+        <p:nvSpPr>
+          <p:cNvPr id="3" name="Espaço Reservado para Anotações 2"/>
+          <p:cNvSpPr>
+            <a:spLocks noGrp="1"/>
+          </p:cNvSpPr>
+          <p:nvPr>
+            <p:ph type="body" idx="1"/>
+          </p:nvPr>
+        </p:nvSpPr>
+        <p:spPr/>
+        <p:txBody>
+          <a:bodyPr>
+            <a:normAutofit/>
+          </a:bodyPr>
+          <a:lstStyle/>
+          <a:p>
+            <a:endParaRPr lang="pt-BR" dirty="0" smtClean="0"/>
+          </a:p>
+        </p:txBody>
+      </p:sp>
+      <p:sp>
+        <p:nvSpPr>
+          <p:cNvPr id="4" name="Espaço Reservado para Número de Slide 3"/>
+          <p:cNvSpPr>
+            <a:spLocks noGrp="1"/>
+          </p:cNvSpPr>
+          <p:nvPr>
+            <p:ph type="sldNum" sz="quarter" idx="10"/>
+          </p:nvPr>
+        </p:nvSpPr>
+        <p:spPr/>
+        <p:txBody>
+          <a:bodyPr/>
+          <a:lstStyle/>
+          <a:p>
+            <a:fld id="{72B91EDC-0C87-4192-8AD8-36C87AC108D0}" type="slidenum">
+              <a:rPr lang="pt-BR" smtClean="0"/>
+              <a:pPr/>
+              <a:t>9</a:t>
+            </a:fld>
+            <a:endParaRPr lang="pt-BR"/>
+          </a:p>
+        </p:txBody>
+      </p:sp>
+    </p:spTree>
+  </p:cSld>
+  <p:clrMapOvr>
+    <a:masterClrMapping/>
+  </p:clrMapOvr>
+</p:notes>
+</file>
+
+<file path=ppt/notesSlides/notesSlide9.xml><?xml version="1.0" encoding="utf-8"?>
+<p:notes xmlns:a="http://schemas.openxmlformats.org/drawingml/2006/main" xmlns:r="http://schemas.openxmlformats.org/officeDocument/2006/relationships" xmlns:p="http://schemas.openxmlformats.org/presentationml/2006/main">
+  <p:cSld>
+    <p:spTree>
+      <p:nvGrpSpPr>
+        <p:cNvPr id="1" name=""/>
+        <p:cNvGrpSpPr/>
+        <p:nvPr/>
+      </p:nvGrpSpPr>
+      <p:grpSpPr>
+        <a:xfrm>
+          <a:off x="0" y="0"/>
+          <a:ext cx="0" cy="0"/>
+          <a:chOff x="0" y="0"/>
+          <a:chExt cx="0" cy="0"/>
+        </a:xfrm>
+      </p:grpSpPr>
+      <p:sp>
+        <p:nvSpPr>
+          <p:cNvPr id="2" name="Espaço Reservado para Imagem de Slide 1"/>
+          <p:cNvSpPr>
+            <a:spLocks noGrp="1" noRot="1" noChangeAspect="1"/>
+          </p:cNvSpPr>
+          <p:nvPr>
+            <p:ph type="sldImg"/>
+          </p:nvPr>
+        </p:nvSpPr>
+        <p:spPr/>
+      </p:sp>
+      <p:sp>
+        <p:nvSpPr>
+          <p:cNvPr id="3" name="Espaço Reservado para Anotações 2"/>
+          <p:cNvSpPr>
+            <a:spLocks noGrp="1"/>
+          </p:cNvSpPr>
+          <p:nvPr>
+            <p:ph type="body" idx="1"/>
+          </p:nvPr>
+        </p:nvSpPr>
+        <p:spPr/>
+        <p:txBody>
+          <a:bodyPr>
+            <a:normAutofit/>
+          </a:bodyPr>
+          <a:lstStyle/>
+          <a:p>
+            <a:endParaRPr lang="pt-BR" dirty="0" smtClean="0"/>
+          </a:p>
+        </p:txBody>
+      </p:sp>
+      <p:sp>
+        <p:nvSpPr>
+          <p:cNvPr id="4" name="Espaço Reservado para Número de Slide 3"/>
+          <p:cNvSpPr>
+            <a:spLocks noGrp="1"/>
+          </p:cNvSpPr>
+          <p:nvPr>
+            <p:ph type="sldNum" sz="quarter" idx="10"/>
+          </p:nvPr>
+        </p:nvSpPr>
+        <p:spPr/>
+        <p:txBody>
+          <a:bodyPr/>
+          <a:lstStyle/>
+          <a:p>
+            <a:fld id="{72B91EDC-0C87-4192-8AD8-36C87AC108D0}" type="slidenum">
+              <a:rPr lang="pt-BR" smtClean="0"/>
+              <a:pPr/>
+              <a:t>10</a:t>
             </a:fld>
             <a:endParaRPr lang="pt-BR"/>
           </a:p>
@@ -1289,7 +1621,7 @@
             <a:fld id="{2E700DB3-DBF0-4086-B675-117E7A9610B8}" type="datetimeFigureOut">
               <a:rPr lang="pt-BR" smtClean="0"/>
               <a:pPr/>
-              <a:t>24/03/2014</a:t>
+              <a:t>26/03/2014</a:t>
             </a:fld>
             <a:endParaRPr lang="pt-BR"/>
           </a:p>
@@ -1514,7 +1846,7 @@
             <a:fld id="{2E700DB3-DBF0-4086-B675-117E7A9610B8}" type="datetimeFigureOut">
               <a:rPr lang="pt-BR" smtClean="0"/>
               <a:pPr/>
-              <a:t>24/03/2014</a:t>
+              <a:t>26/03/2014</a:t>
             </a:fld>
             <a:endParaRPr lang="pt-BR"/>
           </a:p>
@@ -1796,7 +2128,7 @@
             <a:fld id="{2E700DB3-DBF0-4086-B675-117E7A9610B8}" type="datetimeFigureOut">
               <a:rPr lang="pt-BR" smtClean="0"/>
               <a:pPr/>
-              <a:t>24/03/2014</a:t>
+              <a:t>26/03/2014</a:t>
             </a:fld>
             <a:endParaRPr lang="pt-BR"/>
           </a:p>
@@ -1977,7 +2309,7 @@
             <a:fld id="{2E700DB3-DBF0-4086-B675-117E7A9610B8}" type="datetimeFigureOut">
               <a:rPr lang="pt-BR" smtClean="0"/>
               <a:pPr/>
-              <a:t>24/03/2014</a:t>
+              <a:t>26/03/2014</a:t>
             </a:fld>
             <a:endParaRPr lang="pt-BR"/>
           </a:p>
@@ -2337,7 +2669,7 @@
             <a:fld id="{2E700DB3-DBF0-4086-B675-117E7A9610B8}" type="datetimeFigureOut">
               <a:rPr lang="pt-BR" smtClean="0"/>
               <a:pPr/>
-              <a:t>24/03/2014</a:t>
+              <a:t>26/03/2014</a:t>
             </a:fld>
             <a:endParaRPr lang="pt-BR"/>
           </a:p>
@@ -2626,7 +2958,7 @@
             <a:fld id="{2E700DB3-DBF0-4086-B675-117E7A9610B8}" type="datetimeFigureOut">
               <a:rPr lang="pt-BR" smtClean="0"/>
               <a:pPr/>
-              <a:t>24/03/2014</a:t>
+              <a:t>26/03/2014</a:t>
             </a:fld>
             <a:endParaRPr lang="pt-BR"/>
           </a:p>
@@ -3050,7 +3382,7 @@
             <a:fld id="{2E700DB3-DBF0-4086-B675-117E7A9610B8}" type="datetimeFigureOut">
               <a:rPr lang="pt-BR" smtClean="0"/>
               <a:pPr/>
-              <a:t>24/03/2014</a:t>
+              <a:t>26/03/2014</a:t>
             </a:fld>
             <a:endParaRPr lang="pt-BR"/>
           </a:p>
@@ -3167,7 +3499,7 @@
             <a:fld id="{2E700DB3-DBF0-4086-B675-117E7A9610B8}" type="datetimeFigureOut">
               <a:rPr lang="pt-BR" smtClean="0"/>
               <a:pPr/>
-              <a:t>24/03/2014</a:t>
+              <a:t>26/03/2014</a:t>
             </a:fld>
             <a:endParaRPr lang="pt-BR"/>
           </a:p>
@@ -3259,7 +3591,7 @@
             <a:fld id="{2E700DB3-DBF0-4086-B675-117E7A9610B8}" type="datetimeFigureOut">
               <a:rPr lang="pt-BR" smtClean="0"/>
               <a:pPr/>
-              <a:t>24/03/2014</a:t>
+              <a:t>26/03/2014</a:t>
             </a:fld>
             <a:endParaRPr lang="pt-BR"/>
           </a:p>
@@ -3539,7 +3871,7 @@
             <a:fld id="{2E700DB3-DBF0-4086-B675-117E7A9610B8}" type="datetimeFigureOut">
               <a:rPr lang="pt-BR" smtClean="0"/>
               <a:pPr/>
-              <a:t>24/03/2014</a:t>
+              <a:t>26/03/2014</a:t>
             </a:fld>
             <a:endParaRPr lang="pt-BR"/>
           </a:p>
@@ -3907,7 +4239,7 @@
             <a:fld id="{2E700DB3-DBF0-4086-B675-117E7A9610B8}" type="datetimeFigureOut">
               <a:rPr lang="pt-BR" smtClean="0"/>
               <a:pPr/>
-              <a:t>24/03/2014</a:t>
+              <a:t>26/03/2014</a:t>
             </a:fld>
             <a:endParaRPr lang="pt-BR"/>
           </a:p>
@@ -4346,7 +4678,7 @@
             <a:fld id="{2E700DB3-DBF0-4086-B675-117E7A9610B8}" type="datetimeFigureOut">
               <a:rPr lang="pt-BR" smtClean="0"/>
               <a:pPr/>
-              <a:t>24/03/2014</a:t>
+              <a:t>26/03/2014</a:t>
             </a:fld>
             <a:endParaRPr lang="pt-BR"/>
           </a:p>
@@ -4770,8 +5102,11 @@
           <a:p>
             <a:r>
               <a:rPr lang="pt-BR" dirty="0" smtClean="0"/>
-              <a:t>Fundamentos – </a:t>
-            </a:r>
+              <a:t>Fundamentos </a:t>
+            </a:r>
+            <a:br>
+              <a:rPr lang="pt-BR" dirty="0" smtClean="0"/>
+            </a:br>
             <a:r>
               <a:rPr lang="pt-BR" dirty="0" smtClean="0"/>
               <a:t>Orientação a Objetos</a:t>
@@ -4800,6 +5135,586 @@
               <a:t>Treinamento</a:t>
             </a:r>
             <a:endParaRPr lang="pt-BR" dirty="0"/>
+          </a:p>
+        </p:txBody>
+      </p:sp>
+    </p:spTree>
+  </p:cSld>
+  <p:clrMapOvr>
+    <a:masterClrMapping/>
+  </p:clrMapOvr>
+  <p:timing>
+    <p:tnLst>
+      <p:par>
+        <p:cTn id="1" dur="indefinite" restart="never" nodeType="tmRoot"/>
+      </p:par>
+    </p:tnLst>
+  </p:timing>
+</p:sld>
+</file>
+
+<file path=ppt/slides/slide10.xml><?xml version="1.0" encoding="utf-8"?>
+<p:sld xmlns:a="http://schemas.openxmlformats.org/drawingml/2006/main" xmlns:r="http://schemas.openxmlformats.org/officeDocument/2006/relationships" xmlns:p="http://schemas.openxmlformats.org/presentationml/2006/main">
+  <p:cSld>
+    <p:spTree>
+      <p:nvGrpSpPr>
+        <p:cNvPr id="1" name=""/>
+        <p:cNvGrpSpPr/>
+        <p:nvPr/>
+      </p:nvGrpSpPr>
+      <p:grpSpPr>
+        <a:xfrm>
+          <a:off x="0" y="0"/>
+          <a:ext cx="0" cy="0"/>
+          <a:chOff x="0" y="0"/>
+          <a:chExt cx="0" cy="0"/>
+        </a:xfrm>
+      </p:grpSpPr>
+      <p:sp>
+        <p:nvSpPr>
+          <p:cNvPr id="2" name="Título 1"/>
+          <p:cNvSpPr>
+            <a:spLocks noGrp="1"/>
+          </p:cNvSpPr>
+          <p:nvPr>
+            <p:ph type="title"/>
+          </p:nvPr>
+        </p:nvSpPr>
+        <p:spPr/>
+        <p:txBody>
+          <a:bodyPr/>
+          <a:lstStyle/>
+          <a:p>
+            <a:r>
+              <a:rPr lang="pt-BR" dirty="0" smtClean="0"/>
+              <a:t>Orientação a Objetos</a:t>
+            </a:r>
+            <a:endParaRPr lang="pt-BR" dirty="0"/>
+          </a:p>
+        </p:txBody>
+      </p:sp>
+      <p:sp>
+        <p:nvSpPr>
+          <p:cNvPr id="3" name="Espaço Reservado para Conteúdo 2"/>
+          <p:cNvSpPr>
+            <a:spLocks noGrp="1"/>
+          </p:cNvSpPr>
+          <p:nvPr>
+            <p:ph idx="1"/>
+          </p:nvPr>
+        </p:nvSpPr>
+        <p:spPr/>
+        <p:txBody>
+          <a:bodyPr>
+            <a:normAutofit fontScale="92500"/>
+          </a:bodyPr>
+          <a:lstStyle/>
+          <a:p>
+            <a:r>
+              <a:rPr lang="pt-BR" dirty="0" err="1" smtClean="0"/>
+              <a:t>Object</a:t>
+            </a:r>
+            <a:endParaRPr lang="pt-BR" dirty="0" smtClean="0"/>
+          </a:p>
+          <a:p>
+            <a:pPr lvl="1"/>
+            <a:r>
+              <a:rPr lang="pt-BR" dirty="0" smtClean="0"/>
+              <a:t>Provê recursos básicos para qualquer classe Java (continuação)</a:t>
+            </a:r>
+          </a:p>
+          <a:p>
+            <a:pPr lvl="2"/>
+            <a:r>
+              <a:rPr lang="pt-BR" dirty="0" err="1" smtClean="0"/>
+              <a:t>wait</a:t>
+            </a:r>
+            <a:r>
+              <a:rPr lang="pt-BR" dirty="0" smtClean="0"/>
+              <a:t>(), </a:t>
+            </a:r>
+            <a:r>
+              <a:rPr lang="pt-BR" dirty="0" err="1" smtClean="0"/>
+              <a:t>wait</a:t>
+            </a:r>
+            <a:r>
+              <a:rPr lang="pt-BR" dirty="0" smtClean="0"/>
+              <a:t>(</a:t>
+            </a:r>
+            <a:r>
+              <a:rPr lang="pt-BR" dirty="0" err="1" smtClean="0"/>
+              <a:t>millis</a:t>
+            </a:r>
+            <a:r>
+              <a:rPr lang="pt-BR" dirty="0" smtClean="0"/>
+              <a:t>), </a:t>
+            </a:r>
+            <a:r>
+              <a:rPr lang="pt-BR" dirty="0" err="1" smtClean="0"/>
+              <a:t>notify</a:t>
+            </a:r>
+            <a:r>
+              <a:rPr lang="pt-BR" dirty="0" smtClean="0"/>
+              <a:t>(), </a:t>
+            </a:r>
+            <a:r>
+              <a:rPr lang="pt-BR" dirty="0" err="1" smtClean="0"/>
+              <a:t>notifyAll</a:t>
+            </a:r>
+            <a:r>
+              <a:rPr lang="pt-BR" dirty="0" smtClean="0"/>
+              <a:t>()</a:t>
+            </a:r>
+          </a:p>
+          <a:p>
+            <a:pPr lvl="3"/>
+            <a:r>
+              <a:rPr lang="pt-BR" dirty="0" smtClean="0"/>
+              <a:t>Recursos relacionados a Threads</a:t>
+            </a:r>
+          </a:p>
+          <a:p>
+            <a:pPr lvl="2"/>
+            <a:r>
+              <a:rPr lang="pt-BR" dirty="0" err="1" smtClean="0"/>
+              <a:t>boolean</a:t>
+            </a:r>
+            <a:r>
+              <a:rPr lang="pt-BR" dirty="0" smtClean="0"/>
+              <a:t> </a:t>
+            </a:r>
+            <a:r>
+              <a:rPr lang="pt-BR" dirty="0" err="1" smtClean="0"/>
+              <a:t>hashCode</a:t>
+            </a:r>
+            <a:r>
+              <a:rPr lang="pt-BR" dirty="0" smtClean="0"/>
+              <a:t>()</a:t>
+            </a:r>
+          </a:p>
+          <a:p>
+            <a:pPr lvl="3"/>
+            <a:r>
+              <a:rPr lang="pt-BR" dirty="0" smtClean="0"/>
+              <a:t>Recurso relacionado ao framework de </a:t>
+            </a:r>
+            <a:r>
+              <a:rPr lang="pt-BR" dirty="0" err="1" smtClean="0"/>
+              <a:t>Collection</a:t>
+            </a:r>
+            <a:endParaRPr lang="pt-BR" dirty="0" smtClean="0"/>
+          </a:p>
+          <a:p>
+            <a:pPr lvl="2"/>
+            <a:r>
+              <a:rPr lang="pt-BR" dirty="0" smtClean="0"/>
+              <a:t>finalize()</a:t>
+            </a:r>
+          </a:p>
+          <a:p>
+            <a:pPr lvl="3"/>
+            <a:r>
+              <a:rPr lang="pt-BR" dirty="0" err="1" smtClean="0"/>
+              <a:t>Possividade</a:t>
+            </a:r>
+            <a:r>
+              <a:rPr lang="pt-BR" dirty="0" smtClean="0"/>
+              <a:t> de liberação de recursos antes do GC destruir o objeto</a:t>
+            </a:r>
+          </a:p>
+          <a:p>
+            <a:pPr lvl="2"/>
+            <a:r>
+              <a:rPr lang="pt-BR" dirty="0" err="1" smtClean="0"/>
+              <a:t>getClass</a:t>
+            </a:r>
+            <a:r>
+              <a:rPr lang="pt-BR" dirty="0" smtClean="0"/>
+              <a:t>()</a:t>
+            </a:r>
+          </a:p>
+          <a:p>
+            <a:pPr lvl="3"/>
+            <a:r>
+              <a:rPr lang="pt-BR" dirty="0" err="1" smtClean="0"/>
+              <a:t>Reflection</a:t>
+            </a:r>
+            <a:r>
+              <a:rPr lang="pt-BR" dirty="0" smtClean="0"/>
+              <a:t>!!!!</a:t>
+            </a:r>
+          </a:p>
+        </p:txBody>
+      </p:sp>
+    </p:spTree>
+  </p:cSld>
+  <p:clrMapOvr>
+    <a:masterClrMapping/>
+  </p:clrMapOvr>
+  <p:timing>
+    <p:tnLst>
+      <p:par>
+        <p:cTn id="1" dur="indefinite" restart="never" nodeType="tmRoot"/>
+      </p:par>
+    </p:tnLst>
+  </p:timing>
+</p:sld>
+</file>
+
+<file path=ppt/slides/slide11.xml><?xml version="1.0" encoding="utf-8"?>
+<p:sld xmlns:a="http://schemas.openxmlformats.org/drawingml/2006/main" xmlns:r="http://schemas.openxmlformats.org/officeDocument/2006/relationships" xmlns:p="http://schemas.openxmlformats.org/presentationml/2006/main">
+  <p:cSld>
+    <p:spTree>
+      <p:nvGrpSpPr>
+        <p:cNvPr id="1" name=""/>
+        <p:cNvGrpSpPr/>
+        <p:nvPr/>
+      </p:nvGrpSpPr>
+      <p:grpSpPr>
+        <a:xfrm>
+          <a:off x="0" y="0"/>
+          <a:ext cx="0" cy="0"/>
+          <a:chOff x="0" y="0"/>
+          <a:chExt cx="0" cy="0"/>
+        </a:xfrm>
+      </p:grpSpPr>
+      <p:sp>
+        <p:nvSpPr>
+          <p:cNvPr id="2" name="Título 1"/>
+          <p:cNvSpPr>
+            <a:spLocks noGrp="1"/>
+          </p:cNvSpPr>
+          <p:nvPr>
+            <p:ph type="title"/>
+          </p:nvPr>
+        </p:nvSpPr>
+        <p:spPr/>
+        <p:txBody>
+          <a:bodyPr/>
+          <a:lstStyle/>
+          <a:p>
+            <a:r>
+              <a:rPr lang="pt-BR" dirty="0" smtClean="0"/>
+              <a:t>Orientação a Objetos</a:t>
+            </a:r>
+            <a:endParaRPr lang="pt-BR" dirty="0"/>
+          </a:p>
+        </p:txBody>
+      </p:sp>
+      <p:sp>
+        <p:nvSpPr>
+          <p:cNvPr id="3" name="Espaço Reservado para Conteúdo 2"/>
+          <p:cNvSpPr>
+            <a:spLocks noGrp="1"/>
+          </p:cNvSpPr>
+          <p:nvPr>
+            <p:ph idx="1"/>
+          </p:nvPr>
+        </p:nvSpPr>
+        <p:spPr/>
+        <p:txBody>
+          <a:bodyPr>
+            <a:normAutofit/>
+          </a:bodyPr>
+          <a:lstStyle/>
+          <a:p>
+            <a:r>
+              <a:rPr lang="pt-BR" dirty="0" smtClean="0"/>
+              <a:t>String</a:t>
+            </a:r>
+          </a:p>
+          <a:p>
+            <a:pPr lvl="1"/>
+            <a:r>
+              <a:rPr lang="pt-BR" dirty="0" smtClean="0"/>
+              <a:t>Pool de String</a:t>
+            </a:r>
+          </a:p>
+          <a:p>
+            <a:pPr lvl="2"/>
+            <a:r>
+              <a:rPr lang="pt-BR" dirty="0" smtClean="0"/>
+              <a:t>Antes de criar uma String a VM pesquisa no pool para ver se pode reaproveitar uma já existente</a:t>
+            </a:r>
+          </a:p>
+          <a:p>
+            <a:pPr lvl="2"/>
+            <a:r>
+              <a:rPr lang="pt-BR" dirty="0" smtClean="0"/>
+              <a:t>String x = “Eu sou uma String armazenada no Pool”</a:t>
+            </a:r>
+          </a:p>
+          <a:p>
+            <a:pPr lvl="1"/>
+            <a:r>
+              <a:rPr lang="pt-BR" dirty="0" smtClean="0"/>
+              <a:t>String no HEAP</a:t>
+            </a:r>
+          </a:p>
+          <a:p>
+            <a:pPr lvl="2"/>
+            <a:r>
+              <a:rPr lang="pt-BR" dirty="0" smtClean="0"/>
+              <a:t>Strings criadas com o operador </a:t>
+            </a:r>
+            <a:r>
+              <a:rPr lang="pt-BR" dirty="0" err="1" smtClean="0"/>
+              <a:t>new</a:t>
+            </a:r>
+            <a:r>
+              <a:rPr lang="pt-BR" dirty="0" smtClean="0"/>
+              <a:t> são armazenadas no </a:t>
+            </a:r>
+            <a:r>
+              <a:rPr lang="pt-BR" dirty="0" err="1" smtClean="0"/>
+              <a:t>Heap</a:t>
+            </a:r>
+            <a:r>
+              <a:rPr lang="pt-BR" dirty="0" smtClean="0"/>
+              <a:t> como qualquer outro tipo de objeto</a:t>
+            </a:r>
+          </a:p>
+        </p:txBody>
+      </p:sp>
+    </p:spTree>
+  </p:cSld>
+  <p:clrMapOvr>
+    <a:masterClrMapping/>
+  </p:clrMapOvr>
+  <p:timing>
+    <p:tnLst>
+      <p:par>
+        <p:cTn id="1" dur="indefinite" restart="never" nodeType="tmRoot"/>
+      </p:par>
+    </p:tnLst>
+  </p:timing>
+</p:sld>
+</file>
+
+<file path=ppt/slides/slide12.xml><?xml version="1.0" encoding="utf-8"?>
+<p:sld xmlns:a="http://schemas.openxmlformats.org/drawingml/2006/main" xmlns:r="http://schemas.openxmlformats.org/officeDocument/2006/relationships" xmlns:p="http://schemas.openxmlformats.org/presentationml/2006/main">
+  <p:cSld>
+    <p:spTree>
+      <p:nvGrpSpPr>
+        <p:cNvPr id="1" name=""/>
+        <p:cNvGrpSpPr/>
+        <p:nvPr/>
+      </p:nvGrpSpPr>
+      <p:grpSpPr>
+        <a:xfrm>
+          <a:off x="0" y="0"/>
+          <a:ext cx="0" cy="0"/>
+          <a:chOff x="0" y="0"/>
+          <a:chExt cx="0" cy="0"/>
+        </a:xfrm>
+      </p:grpSpPr>
+      <p:sp>
+        <p:nvSpPr>
+          <p:cNvPr id="2" name="Título 1"/>
+          <p:cNvSpPr>
+            <a:spLocks noGrp="1"/>
+          </p:cNvSpPr>
+          <p:nvPr>
+            <p:ph type="title"/>
+          </p:nvPr>
+        </p:nvSpPr>
+        <p:spPr/>
+        <p:txBody>
+          <a:bodyPr/>
+          <a:lstStyle/>
+          <a:p>
+            <a:r>
+              <a:rPr lang="pt-BR" dirty="0" smtClean="0"/>
+              <a:t>Orientação a Objetos</a:t>
+            </a:r>
+            <a:endParaRPr lang="pt-BR" dirty="0"/>
+          </a:p>
+        </p:txBody>
+      </p:sp>
+      <p:sp>
+        <p:nvSpPr>
+          <p:cNvPr id="3" name="Espaço Reservado para Conteúdo 2"/>
+          <p:cNvSpPr>
+            <a:spLocks noGrp="1"/>
+          </p:cNvSpPr>
+          <p:nvPr>
+            <p:ph idx="1"/>
+          </p:nvPr>
+        </p:nvSpPr>
+        <p:spPr/>
+        <p:txBody>
+          <a:bodyPr>
+            <a:normAutofit fontScale="77500" lnSpcReduction="20000"/>
+          </a:bodyPr>
+          <a:lstStyle/>
+          <a:p>
+            <a:r>
+              <a:rPr lang="pt-BR" dirty="0" err="1" smtClean="0"/>
+              <a:t>JavaBeans</a:t>
+            </a:r>
+            <a:endParaRPr lang="pt-BR" dirty="0" smtClean="0"/>
+          </a:p>
+          <a:p>
+            <a:pPr lvl="1"/>
+            <a:r>
+              <a:rPr lang="pt-BR" dirty="0" smtClean="0"/>
+              <a:t>Modelo de Componente</a:t>
+            </a:r>
+          </a:p>
+          <a:p>
+            <a:pPr lvl="1"/>
+            <a:r>
+              <a:rPr lang="pt-BR" dirty="0" err="1" smtClean="0"/>
+              <a:t>JavaBean</a:t>
+            </a:r>
+            <a:r>
+              <a:rPr lang="pt-BR" dirty="0" smtClean="0"/>
+              <a:t> Não Visual = POJO (</a:t>
+            </a:r>
+            <a:r>
+              <a:rPr lang="pt-BR" dirty="0" err="1" smtClean="0"/>
+              <a:t>Plain</a:t>
+            </a:r>
+            <a:r>
+              <a:rPr lang="pt-BR" dirty="0" smtClean="0"/>
+              <a:t> </a:t>
+            </a:r>
+            <a:r>
+              <a:rPr lang="pt-BR" dirty="0" err="1" smtClean="0"/>
+              <a:t>Old</a:t>
+            </a:r>
+            <a:r>
+              <a:rPr lang="pt-BR" dirty="0" smtClean="0"/>
+              <a:t> Java </a:t>
+            </a:r>
+            <a:r>
+              <a:rPr lang="pt-BR" dirty="0" err="1" smtClean="0"/>
+              <a:t>Object</a:t>
+            </a:r>
+            <a:r>
+              <a:rPr lang="pt-BR" dirty="0" smtClean="0"/>
+              <a:t>)</a:t>
+            </a:r>
+          </a:p>
+          <a:p>
+            <a:pPr lvl="1"/>
+            <a:r>
+              <a:rPr lang="pt-BR" dirty="0" smtClean="0"/>
+              <a:t>Propriedades disponibilizadas através dos </a:t>
+            </a:r>
+            <a:r>
+              <a:rPr lang="pt-BR" i="1" dirty="0" err="1" smtClean="0"/>
+              <a:t>getters</a:t>
+            </a:r>
+            <a:r>
+              <a:rPr lang="pt-BR" i="1" dirty="0" smtClean="0"/>
+              <a:t> </a:t>
+            </a:r>
+            <a:r>
+              <a:rPr lang="pt-BR" i="1" dirty="0" err="1" smtClean="0"/>
+              <a:t>and</a:t>
+            </a:r>
+            <a:r>
+              <a:rPr lang="pt-BR" i="1" dirty="0" smtClean="0"/>
+              <a:t> </a:t>
+            </a:r>
+            <a:r>
+              <a:rPr lang="pt-BR" i="1" dirty="0" err="1" smtClean="0"/>
+              <a:t>setters</a:t>
+            </a:r>
+            <a:endParaRPr lang="pt-BR" i="1" dirty="0" smtClean="0"/>
+          </a:p>
+          <a:p>
+            <a:pPr lvl="1"/>
+            <a:r>
+              <a:rPr lang="pt-BR" dirty="0" smtClean="0"/>
+              <a:t>Construtor Default</a:t>
+            </a:r>
+            <a:endParaRPr lang="pt-BR" dirty="0" smtClean="0"/>
+          </a:p>
+          <a:p>
+            <a:pPr lvl="1"/>
+            <a:r>
+              <a:rPr lang="pt-BR" dirty="0" smtClean="0"/>
+              <a:t>UI </a:t>
+            </a:r>
+            <a:r>
+              <a:rPr lang="pt-BR" dirty="0" err="1" smtClean="0"/>
+              <a:t>Builder</a:t>
+            </a:r>
+            <a:r>
+              <a:rPr lang="pt-BR" dirty="0" smtClean="0"/>
+              <a:t> (ferramentas visuais)</a:t>
+            </a:r>
+          </a:p>
+          <a:p>
+            <a:pPr lvl="1"/>
+            <a:r>
+              <a:rPr lang="pt-BR" dirty="0" smtClean="0"/>
+              <a:t>Eventos</a:t>
+            </a:r>
+          </a:p>
+          <a:p>
+            <a:pPr lvl="1"/>
+            <a:r>
+              <a:rPr lang="pt-BR" dirty="0" err="1" smtClean="0"/>
+              <a:t>Peristência</a:t>
+            </a:r>
+            <a:r>
+              <a:rPr lang="pt-BR" dirty="0" smtClean="0"/>
+              <a:t> (serialização)</a:t>
+            </a:r>
+          </a:p>
+          <a:p>
+            <a:pPr lvl="1"/>
+            <a:r>
+              <a:rPr lang="pt-BR" dirty="0" err="1" smtClean="0"/>
+              <a:t>Introspection</a:t>
+            </a:r>
+            <a:r>
+              <a:rPr lang="pt-BR" dirty="0" smtClean="0"/>
+              <a:t> (processo de analisar o </a:t>
+            </a:r>
+            <a:r>
+              <a:rPr lang="pt-BR" dirty="0" err="1" smtClean="0"/>
+              <a:t>bean</a:t>
+            </a:r>
+            <a:r>
+              <a:rPr lang="pt-BR" dirty="0" smtClean="0"/>
+              <a:t> para obter suas propriedades, eventos e métodos)</a:t>
+            </a:r>
+          </a:p>
+          <a:p>
+            <a:pPr lvl="2"/>
+            <a:r>
+              <a:rPr lang="pt-BR" dirty="0" smtClean="0"/>
+              <a:t>Suportado por </a:t>
+            </a:r>
+            <a:r>
+              <a:rPr lang="pt-BR" dirty="0" err="1" smtClean="0"/>
+              <a:t>Reflection</a:t>
+            </a:r>
+            <a:endParaRPr lang="pt-BR" dirty="0" smtClean="0"/>
+          </a:p>
+          <a:p>
+            <a:pPr lvl="1"/>
+            <a:r>
+              <a:rPr lang="pt-BR" dirty="0" err="1" smtClean="0"/>
+              <a:t>BeanInfo</a:t>
+            </a:r>
+            <a:endParaRPr lang="pt-BR" dirty="0" smtClean="0"/>
+          </a:p>
+          <a:p>
+            <a:pPr lvl="2"/>
+            <a:r>
+              <a:rPr lang="pt-BR" dirty="0" smtClean="0"/>
+              <a:t>Explicita informações sobre o </a:t>
+            </a:r>
+            <a:r>
+              <a:rPr lang="pt-BR" dirty="0" err="1" smtClean="0"/>
+              <a:t>Bean</a:t>
+            </a:r>
+            <a:endParaRPr lang="pt-BR" dirty="0" smtClean="0"/>
           </a:p>
         </p:txBody>
       </p:sp>
@@ -4879,42 +5794,36 @@
               <a:rPr lang="pt-BR" dirty="0" smtClean="0"/>
               <a:t>Paradigma de Modelagem Orientação a Objetos</a:t>
             </a:r>
-            <a:endParaRPr lang="pt-BR" dirty="0" smtClean="0"/>
           </a:p>
           <a:p>
             <a:r>
               <a:rPr lang="pt-BR" dirty="0" smtClean="0"/>
               <a:t>Classe</a:t>
             </a:r>
-            <a:endParaRPr lang="pt-BR" dirty="0" smtClean="0"/>
           </a:p>
           <a:p>
             <a:r>
               <a:rPr lang="pt-BR" dirty="0" smtClean="0"/>
               <a:t>Objeto (Instância)</a:t>
             </a:r>
-            <a:endParaRPr lang="pt-BR" dirty="0" smtClean="0"/>
           </a:p>
           <a:p>
             <a:r>
               <a:rPr lang="pt-BR" dirty="0" smtClean="0"/>
               <a:t>Métodos (Mensagem)</a:t>
             </a:r>
-            <a:endParaRPr lang="pt-BR" dirty="0" smtClean="0"/>
           </a:p>
           <a:p>
             <a:r>
               <a:rPr lang="pt-BR" dirty="0" smtClean="0"/>
               <a:t>Atributos</a:t>
             </a:r>
-            <a:endParaRPr lang="pt-BR" dirty="0" smtClean="0"/>
           </a:p>
           <a:p>
             <a:r>
               <a:rPr lang="pt-BR" dirty="0" smtClean="0"/>
               <a:t>Herança </a:t>
             </a:r>
-            <a:endParaRPr lang="pt-BR" dirty="0" smtClean="0"/>
           </a:p>
           <a:p>
             <a:pPr lvl="1"/>
@@ -4929,7 +5838,6 @@
               <a:rPr lang="pt-BR" dirty="0" smtClean="0"/>
               <a:t>Herança Múltipla</a:t>
             </a:r>
-            <a:endParaRPr lang="pt-BR" dirty="0" smtClean="0"/>
           </a:p>
           <a:p>
             <a:pPr lvl="1"/>
@@ -4937,14 +5845,12 @@
               <a:rPr lang="pt-BR" dirty="0" smtClean="0"/>
               <a:t>Polimorfismo</a:t>
             </a:r>
-            <a:endParaRPr lang="pt-BR" dirty="0" smtClean="0"/>
           </a:p>
           <a:p>
             <a:r>
               <a:rPr lang="pt-BR" dirty="0" smtClean="0"/>
               <a:t>Visibilidade de Classes, Atributos Métodos</a:t>
             </a:r>
-            <a:endParaRPr lang="pt-BR" dirty="0" smtClean="0"/>
           </a:p>
           <a:p>
             <a:pPr lvl="1"/>
@@ -5084,7 +5990,6 @@
               <a:rPr lang="pt-BR" dirty="0" smtClean="0"/>
               <a:t>Sobrescrita</a:t>
             </a:r>
-            <a:endParaRPr lang="pt-BR" dirty="0" smtClean="0"/>
           </a:p>
         </p:txBody>
       </p:sp>
@@ -5171,7 +6076,6 @@
               <a:rPr lang="pt-BR" dirty="0" smtClean="0"/>
               <a:t>Modelo, ideia, categoria</a:t>
             </a:r>
-            <a:endParaRPr lang="pt-BR" dirty="0" smtClean="0"/>
           </a:p>
           <a:p>
             <a:r>
@@ -5219,7 +6123,6 @@
               <a:rPr lang="pt-BR" dirty="0" smtClean="0"/>
               <a:t>Funções/Procedimentos/Comportamento</a:t>
             </a:r>
-            <a:endParaRPr lang="pt-BR" dirty="0" smtClean="0"/>
           </a:p>
           <a:p>
             <a:r>
@@ -5334,7 +6237,6 @@
               <a:rPr lang="pt-BR" dirty="0" smtClean="0"/>
               <a:t>Herança </a:t>
             </a:r>
-            <a:endParaRPr lang="pt-BR" dirty="0" smtClean="0"/>
           </a:p>
           <a:p>
             <a:pPr lvl="1"/>
@@ -5342,17 +6244,12 @@
               <a:rPr lang="pt-BR" dirty="0" smtClean="0"/>
               <a:t>Permite que uma classe herde características (atributos) e comportamento (métodos) de uma classe mãe (ou pai)</a:t>
             </a:r>
-            <a:endParaRPr lang="pt-BR" dirty="0" smtClean="0"/>
           </a:p>
           <a:p>
             <a:pPr lvl="1"/>
             <a:r>
               <a:rPr lang="pt-BR" dirty="0" smtClean="0"/>
-              <a:t>Herança </a:t>
-            </a:r>
-            <a:r>
-              <a:rPr lang="pt-BR" dirty="0" smtClean="0"/>
-              <a:t>Simples</a:t>
+              <a:t>Herança Simples</a:t>
             </a:r>
           </a:p>
           <a:p>
@@ -5361,17 +6258,12 @@
               <a:rPr lang="pt-BR" dirty="0" smtClean="0"/>
               <a:t>Apenas uma superclasse</a:t>
             </a:r>
-            <a:endParaRPr lang="pt-BR" dirty="0" smtClean="0"/>
           </a:p>
           <a:p>
             <a:pPr lvl="1"/>
             <a:r>
               <a:rPr lang="pt-BR" dirty="0" smtClean="0"/>
-              <a:t>Herança </a:t>
-            </a:r>
-            <a:r>
-              <a:rPr lang="pt-BR" dirty="0" smtClean="0"/>
-              <a:t>Múltipla</a:t>
+              <a:t>Herança Múltipla</a:t>
             </a:r>
           </a:p>
           <a:p>
@@ -5387,7 +6279,6 @@
               <a:rPr lang="pt-BR" dirty="0" smtClean="0"/>
               <a:t>Java NÃO possui herança múltipla, apenas simples</a:t>
             </a:r>
-            <a:endParaRPr lang="pt-BR" dirty="0" smtClean="0"/>
           </a:p>
           <a:p>
             <a:pPr lvl="1"/>
@@ -5424,7 +6315,6 @@
               <a:rPr lang="pt-BR" dirty="0" smtClean="0"/>
               <a:t>)</a:t>
             </a:r>
-            <a:endParaRPr lang="pt-BR" dirty="0" smtClean="0"/>
           </a:p>
         </p:txBody>
       </p:sp>
@@ -5504,7 +6394,6 @@
               <a:rPr lang="pt-BR" dirty="0" smtClean="0"/>
               <a:t>Visibilidade de Classes, Atributos Métodos</a:t>
             </a:r>
-            <a:endParaRPr lang="pt-BR" dirty="0" smtClean="0"/>
           </a:p>
           <a:p>
             <a:pPr lvl="1"/>
@@ -5560,7 +6449,6 @@
               <a:rPr lang="pt-BR" dirty="0" smtClean="0"/>
               <a:t>: Acessível apenas dentro da mesma classe</a:t>
             </a:r>
-            <a:endParaRPr lang="pt-BR" dirty="0" smtClean="0"/>
           </a:p>
         </p:txBody>
       </p:sp>
@@ -5647,7 +6535,6 @@
               <a:rPr lang="pt-BR" dirty="0" smtClean="0"/>
               <a:t>Capacidade de focar num nível de detalhe do modelo</a:t>
             </a:r>
-            <a:endParaRPr lang="pt-BR" dirty="0" smtClean="0"/>
           </a:p>
           <a:p>
             <a:r>
@@ -5688,7 +6575,6 @@
               <a:rPr lang="pt-BR" dirty="0" smtClean="0"/>
               <a:t>Oferecem suporte às subclasses</a:t>
             </a:r>
-            <a:endParaRPr lang="pt-BR" dirty="0" smtClean="0"/>
           </a:p>
           <a:p>
             <a:r>
@@ -5722,7 +6608,6 @@
               <a:rPr lang="pt-BR" dirty="0" smtClean="0"/>
               <a:t>Método especial que retornam a instância criada da classe</a:t>
             </a:r>
-            <a:endParaRPr lang="pt-BR" dirty="0" smtClean="0"/>
           </a:p>
         </p:txBody>
       </p:sp>
@@ -5800,16 +6685,16 @@
           <a:p>
             <a:r>
               <a:rPr lang="pt-BR" dirty="0" smtClean="0"/>
-              <a:t>Sobrecarga</a:t>
-            </a:r>
-          </a:p>
-          <a:p>
-            <a:pPr lvl="1"/>
+              <a:t>Sobrecarga (</a:t>
+            </a:r>
             <a:r>
               <a:rPr lang="pt-BR" dirty="0" err="1" smtClean="0"/>
               <a:t>Overload</a:t>
             </a:r>
-            <a:endParaRPr lang="pt-BR" dirty="0" smtClean="0"/>
+            <a:r>
+              <a:rPr lang="pt-BR" dirty="0" smtClean="0"/>
+              <a:t>)</a:t>
+            </a:r>
           </a:p>
           <a:p>
             <a:pPr lvl="1"/>
@@ -5821,23 +6706,203 @@
           <a:p>
             <a:r>
               <a:rPr lang="pt-BR" dirty="0" smtClean="0"/>
-              <a:t>Sobrescrita</a:t>
-            </a:r>
-          </a:p>
-          <a:p>
-            <a:pPr lvl="1"/>
+              <a:t>Sobrescrita (</a:t>
+            </a:r>
             <a:r>
               <a:rPr lang="pt-BR" dirty="0" err="1" smtClean="0"/>
               <a:t>Override</a:t>
             </a:r>
+            <a:r>
+              <a:rPr lang="pt-BR" dirty="0" smtClean="0"/>
+              <a:t>)</a:t>
+            </a:r>
+          </a:p>
+          <a:p>
+            <a:pPr lvl="1"/>
+            <a:r>
+              <a:rPr lang="pt-BR" dirty="0" smtClean="0"/>
+              <a:t>Quando uma subclasse sobrescreve um método da superclasse</a:t>
+            </a:r>
+          </a:p>
+        </p:txBody>
+      </p:sp>
+    </p:spTree>
+  </p:cSld>
+  <p:clrMapOvr>
+    <a:masterClrMapping/>
+  </p:clrMapOvr>
+  <p:timing>
+    <p:tnLst>
+      <p:par>
+        <p:cTn id="1" dur="indefinite" restart="never" nodeType="tmRoot"/>
+      </p:par>
+    </p:tnLst>
+  </p:timing>
+</p:sld>
+</file>
+
+<file path=ppt/slides/slide9.xml><?xml version="1.0" encoding="utf-8"?>
+<p:sld xmlns:a="http://schemas.openxmlformats.org/drawingml/2006/main" xmlns:r="http://schemas.openxmlformats.org/officeDocument/2006/relationships" xmlns:p="http://schemas.openxmlformats.org/presentationml/2006/main">
+  <p:cSld>
+    <p:spTree>
+      <p:nvGrpSpPr>
+        <p:cNvPr id="1" name=""/>
+        <p:cNvGrpSpPr/>
+        <p:nvPr/>
+      </p:nvGrpSpPr>
+      <p:grpSpPr>
+        <a:xfrm>
+          <a:off x="0" y="0"/>
+          <a:ext cx="0" cy="0"/>
+          <a:chOff x="0" y="0"/>
+          <a:chExt cx="0" cy="0"/>
+        </a:xfrm>
+      </p:grpSpPr>
+      <p:sp>
+        <p:nvSpPr>
+          <p:cNvPr id="2" name="Título 1"/>
+          <p:cNvSpPr>
+            <a:spLocks noGrp="1"/>
+          </p:cNvSpPr>
+          <p:nvPr>
+            <p:ph type="title"/>
+          </p:nvPr>
+        </p:nvSpPr>
+        <p:spPr/>
+        <p:txBody>
+          <a:bodyPr/>
+          <a:lstStyle/>
+          <a:p>
+            <a:r>
+              <a:rPr lang="pt-BR" dirty="0" smtClean="0"/>
+              <a:t>Orientação a Objetos</a:t>
+            </a:r>
+            <a:endParaRPr lang="pt-BR" dirty="0"/>
+          </a:p>
+        </p:txBody>
+      </p:sp>
+      <p:sp>
+        <p:nvSpPr>
+          <p:cNvPr id="3" name="Espaço Reservado para Conteúdo 2"/>
+          <p:cNvSpPr>
+            <a:spLocks noGrp="1"/>
+          </p:cNvSpPr>
+          <p:nvPr>
+            <p:ph idx="1"/>
+          </p:nvPr>
+        </p:nvSpPr>
+        <p:spPr/>
+        <p:txBody>
+          <a:bodyPr>
+            <a:normAutofit/>
+          </a:bodyPr>
+          <a:lstStyle/>
+          <a:p>
+            <a:r>
+              <a:rPr lang="pt-BR" dirty="0" err="1" smtClean="0"/>
+              <a:t>Object</a:t>
+            </a:r>
             <a:endParaRPr lang="pt-BR" dirty="0" smtClean="0"/>
           </a:p>
           <a:p>
             <a:pPr lvl="1"/>
             <a:r>
               <a:rPr lang="pt-BR" dirty="0" smtClean="0"/>
-              <a:t>Quando uma subclasse sobrescreve um método da superclasse</a:t>
-            </a:r>
+              <a:t>Superclasse “Cósmica”</a:t>
+            </a:r>
+          </a:p>
+          <a:p>
+            <a:pPr lvl="1"/>
+            <a:r>
+              <a:rPr lang="pt-BR" dirty="0" smtClean="0"/>
+              <a:t>Provê recursos básicos para qualquer classe Java</a:t>
+            </a:r>
+          </a:p>
+          <a:p>
+            <a:pPr lvl="2"/>
+            <a:r>
+              <a:rPr lang="pt-BR" dirty="0" err="1" smtClean="0"/>
+              <a:t>boolean</a:t>
+            </a:r>
+            <a:r>
+              <a:rPr lang="pt-BR" dirty="0" smtClean="0"/>
+              <a:t> </a:t>
+            </a:r>
+            <a:r>
+              <a:rPr lang="pt-BR" dirty="0" err="1" smtClean="0"/>
+              <a:t>equals</a:t>
+            </a:r>
+            <a:r>
+              <a:rPr lang="pt-BR" dirty="0" smtClean="0"/>
+              <a:t>(</a:t>
+            </a:r>
+            <a:r>
+              <a:rPr lang="pt-BR" dirty="0" err="1" smtClean="0"/>
+              <a:t>Object</a:t>
+            </a:r>
+            <a:r>
+              <a:rPr lang="pt-BR" dirty="0" smtClean="0"/>
+              <a:t>)</a:t>
+            </a:r>
+          </a:p>
+          <a:p>
+            <a:pPr lvl="3"/>
+            <a:r>
+              <a:rPr lang="pt-BR" dirty="0" smtClean="0"/>
+              <a:t>Permite que seja definido uma semântica de igualdade</a:t>
+            </a:r>
+          </a:p>
+          <a:p>
+            <a:pPr lvl="2"/>
+            <a:r>
+              <a:rPr lang="pt-BR" dirty="0" smtClean="0"/>
+              <a:t>String </a:t>
+            </a:r>
+            <a:r>
+              <a:rPr lang="pt-BR" dirty="0" err="1" smtClean="0"/>
+              <a:t>toString</a:t>
+            </a:r>
+            <a:r>
+              <a:rPr lang="pt-BR" dirty="0" smtClean="0"/>
+              <a:t>()</a:t>
+            </a:r>
+          </a:p>
+          <a:p>
+            <a:pPr lvl="3"/>
+            <a:r>
+              <a:rPr lang="pt-BR" dirty="0" smtClean="0"/>
+              <a:t>Permite definir uma representação String do objeto</a:t>
+            </a:r>
+          </a:p>
+          <a:p>
+            <a:pPr lvl="2"/>
+            <a:r>
+              <a:rPr lang="pt-BR" dirty="0" err="1" smtClean="0"/>
+              <a:t>Object</a:t>
+            </a:r>
+            <a:r>
+              <a:rPr lang="pt-BR" dirty="0" smtClean="0"/>
+              <a:t> clone()</a:t>
+            </a:r>
+          </a:p>
+          <a:p>
+            <a:pPr lvl="3"/>
+            <a:r>
+              <a:rPr lang="pt-BR" dirty="0" smtClean="0"/>
+              <a:t>Permite clonar o objeto</a:t>
+            </a:r>
+          </a:p>
+          <a:p>
+            <a:pPr lvl="3"/>
+            <a:r>
+              <a:rPr lang="pt-BR" dirty="0" smtClean="0"/>
+              <a:t>Deve-se implementar a interface </a:t>
+            </a:r>
+            <a:r>
+              <a:rPr lang="pt-BR" dirty="0" err="1" smtClean="0"/>
+              <a:t>Cloneable</a:t>
+            </a:r>
+            <a:endParaRPr lang="pt-BR" dirty="0" smtClean="0"/>
           </a:p>
         </p:txBody>
       </p:sp>

</xml_diff>